<commit_message>
Change topic 10 example
</commit_message>
<xml_diff>
--- a/topic-10-Handlebars-2/talk-1/talk-1.pptx
+++ b/topic-10-Handlebars-2/talk-1/talk-1.pptx
@@ -5,7 +5,7 @@
     <p:sldMasterId id="2147483660" r:id="rId1"/>
   </p:sldMasterIdLst>
   <p:notesMasterIdLst>
-    <p:notesMasterId r:id="rId19"/>
+    <p:notesMasterId r:id="rId22"/>
   </p:notesMasterIdLst>
   <p:sldIdLst>
     <p:sldId id="263" r:id="rId2"/>
@@ -13,18 +13,21 @@
     <p:sldId id="265" r:id="rId4"/>
     <p:sldId id="266" r:id="rId5"/>
     <p:sldId id="270" r:id="rId6"/>
-    <p:sldId id="267" r:id="rId7"/>
-    <p:sldId id="269" r:id="rId8"/>
-    <p:sldId id="268" r:id="rId9"/>
-    <p:sldId id="271" r:id="rId10"/>
-    <p:sldId id="272" r:id="rId11"/>
-    <p:sldId id="273" r:id="rId12"/>
-    <p:sldId id="274" r:id="rId13"/>
-    <p:sldId id="275" r:id="rId14"/>
-    <p:sldId id="276" r:id="rId15"/>
-    <p:sldId id="277" r:id="rId16"/>
-    <p:sldId id="278" r:id="rId17"/>
-    <p:sldId id="279" r:id="rId18"/>
+    <p:sldId id="280" r:id="rId7"/>
+    <p:sldId id="267" r:id="rId8"/>
+    <p:sldId id="269" r:id="rId9"/>
+    <p:sldId id="268" r:id="rId10"/>
+    <p:sldId id="281" r:id="rId11"/>
+    <p:sldId id="271" r:id="rId12"/>
+    <p:sldId id="272" r:id="rId13"/>
+    <p:sldId id="273" r:id="rId14"/>
+    <p:sldId id="282" r:id="rId15"/>
+    <p:sldId id="274" r:id="rId16"/>
+    <p:sldId id="275" r:id="rId17"/>
+    <p:sldId id="276" r:id="rId18"/>
+    <p:sldId id="277" r:id="rId19"/>
+    <p:sldId id="278" r:id="rId20"/>
+    <p:sldId id="279" r:id="rId21"/>
   </p:sldIdLst>
   <p:sldSz cx="9144000" cy="6858000" type="screen4x3"/>
   <p:notesSz cx="6858000" cy="9144000"/>
@@ -208,7 +211,7 @@
           <a:p>
             <a:fld id="{8E4749A1-1354-4B31-A959-BEB02DA56C1D}" type="datetimeFigureOut">
               <a:rPr lang="en-US" smtClean="0"/>
-              <a:t>4/12/2018</a:t>
+              <a:t>4/16/2018</a:t>
             </a:fld>
             <a:endParaRPr lang="en-US"/>
           </a:p>
@@ -1778,7 +1781,7 @@
                 </a:solidFill>
               </a:rPr>
               <a:pPr/>
-              <a:t>4/12/2018</a:t>
+              <a:t>4/16/2018</a:t>
             </a:fld>
             <a:endParaRPr lang="en-US">
               <a:solidFill>
@@ -2087,7 +2090,7 @@
                 </a:solidFill>
               </a:rPr>
               <a:pPr/>
-              <a:t>4/12/2018</a:t>
+              <a:t>4/16/2018</a:t>
             </a:fld>
             <a:endParaRPr lang="en-US">
               <a:solidFill>
@@ -2304,7 +2307,7 @@
                 </a:solidFill>
               </a:rPr>
               <a:pPr/>
-              <a:t>4/12/2018</a:t>
+              <a:t>4/16/2018</a:t>
             </a:fld>
             <a:endParaRPr lang="en-US">
               <a:solidFill>
@@ -2511,7 +2514,7 @@
                 </a:solidFill>
               </a:rPr>
               <a:pPr/>
-              <a:t>4/12/2018</a:t>
+              <a:t>4/16/2018</a:t>
             </a:fld>
             <a:endParaRPr lang="en-US">
               <a:solidFill>
@@ -3141,7 +3144,7 @@
                 </a:solidFill>
               </a:rPr>
               <a:pPr/>
-              <a:t>4/12/2018</a:t>
+              <a:t>4/16/2018</a:t>
             </a:fld>
             <a:endParaRPr lang="en-US">
               <a:solidFill>
@@ -4972,7 +4975,7 @@
                 </a:solidFill>
               </a:rPr>
               <a:pPr/>
-              <a:t>4/12/2018</a:t>
+              <a:t>4/16/2018</a:t>
             </a:fld>
             <a:endParaRPr lang="en-US">
               <a:solidFill>
@@ -5061,7 +5064,7 @@
   </p:clrMapOvr>
   <p:extLst mod="1">
     <p:ext uri="{DCECCB84-F9BA-43D5-87BE-67443E8EF086}">
-      <p15:sldGuideLst xmlns="" xmlns:p15="http://schemas.microsoft.com/office/powerpoint/2012/main"/>
+      <p15:sldGuideLst xmlns:p15="http://schemas.microsoft.com/office/powerpoint/2012/main" xmlns=""/>
     </p:ext>
   </p:extLst>
 </p:sldLayout>
@@ -5399,7 +5402,7 @@
                 </a:solidFill>
               </a:rPr>
               <a:pPr/>
-              <a:t>4/12/2018</a:t>
+              <a:t>4/16/2018</a:t>
             </a:fld>
             <a:endParaRPr lang="en-US">
               <a:solidFill>
@@ -5488,7 +5491,7 @@
   </p:clrMapOvr>
   <p:extLst mod="1">
     <p:ext uri="{DCECCB84-F9BA-43D5-87BE-67443E8EF086}">
-      <p15:sldGuideLst xmlns="" xmlns:p15="http://schemas.microsoft.com/office/powerpoint/2012/main"/>
+      <p15:sldGuideLst xmlns:p15="http://schemas.microsoft.com/office/powerpoint/2012/main" xmlns=""/>
     </p:ext>
   </p:extLst>
 </p:sldLayout>
@@ -5559,7 +5562,7 @@
                 </a:solidFill>
               </a:rPr>
               <a:pPr/>
-              <a:t>4/12/2018</a:t>
+              <a:t>4/16/2018</a:t>
             </a:fld>
             <a:endParaRPr lang="en-US">
               <a:solidFill>
@@ -5691,7 +5694,7 @@
                 </a:solidFill>
               </a:rPr>
               <a:pPr/>
-              <a:t>4/12/2018</a:t>
+              <a:t>4/16/2018</a:t>
             </a:fld>
             <a:endParaRPr lang="en-US">
               <a:solidFill>
@@ -6493,7 +6496,7 @@
                 </a:solidFill>
               </a:rPr>
               <a:pPr/>
-              <a:t>4/12/2018</a:t>
+              <a:t>4/16/2018</a:t>
             </a:fld>
             <a:endParaRPr lang="en-US">
               <a:solidFill>
@@ -6668,7 +6671,7 @@
   </p:clrMapOvr>
   <p:extLst mod="1">
     <p:ext uri="{DCECCB84-F9BA-43D5-87BE-67443E8EF086}">
-      <p15:sldGuideLst xmlns="" xmlns:p15="http://schemas.microsoft.com/office/powerpoint/2012/main">
+      <p15:sldGuideLst xmlns:p15="http://schemas.microsoft.com/office/powerpoint/2012/main" xmlns="">
         <p15:guide id="1" orient="horz" pos="696">
           <p15:clr>
             <a:srgbClr val="FBAE40"/>
@@ -7410,7 +7413,7 @@
                 </a:solidFill>
               </a:rPr>
               <a:pPr/>
-              <a:t>4/12/2018</a:t>
+              <a:t>4/16/2018</a:t>
             </a:fld>
             <a:endParaRPr lang="en-US">
               <a:solidFill>
@@ -7712,7 +7715,7 @@
                 </a:solidFill>
               </a:rPr>
               <a:pPr/>
-              <a:t>4/12/2018</a:t>
+              <a:t>4/16/2018</a:t>
             </a:fld>
             <a:endParaRPr lang="en-US">
               <a:solidFill>
@@ -8359,7 +8362,7 @@
   </p:txStyles>
   <p:extLst mod="1">
     <p:ext uri="{27BBF7A9-308A-43DC-89C8-2F10F3537804}">
-      <p15:sldGuideLst xmlns="" xmlns:p15="http://schemas.microsoft.com/office/powerpoint/2012/main">
+      <p15:sldGuideLst xmlns:p15="http://schemas.microsoft.com/office/powerpoint/2012/main" xmlns="">
         <p15:guide id="1" pos="792">
           <p15:clr>
             <a:srgbClr val="F26B43"/>
@@ -8475,6 +8478,296 @@
 </file>
 
 <file path=ppt/slides/slide10.xml><?xml version="1.0" encoding="utf-8"?>
+<p:sld xmlns:a="http://schemas.openxmlformats.org/drawingml/2006/main" xmlns:r="http://schemas.openxmlformats.org/officeDocument/2006/relationships" xmlns:p="http://schemas.openxmlformats.org/presentationml/2006/main">
+  <p:cSld>
+    <p:spTree>
+      <p:nvGrpSpPr>
+        <p:cNvPr id="1" name=""/>
+        <p:cNvGrpSpPr/>
+        <p:nvPr/>
+      </p:nvGrpSpPr>
+      <p:grpSpPr>
+        <a:xfrm>
+          <a:off x="0" y="0"/>
+          <a:ext cx="0" cy="0"/>
+          <a:chOff x="0" y="0"/>
+          <a:chExt cx="0" cy="0"/>
+        </a:xfrm>
+      </p:grpSpPr>
+      <p:sp>
+        <p:nvSpPr>
+          <p:cNvPr id="2" name="Title 1"/>
+          <p:cNvSpPr>
+            <a:spLocks noGrp="1"/>
+          </p:cNvSpPr>
+          <p:nvPr>
+            <p:ph type="title"/>
+          </p:nvPr>
+        </p:nvSpPr>
+        <p:spPr/>
+        <p:txBody>
+          <a:bodyPr>
+            <a:normAutofit fontScale="90000"/>
+          </a:bodyPr>
+          <a:lstStyle/>
+          <a:p>
+            <a:r>
+              <a:rPr lang="en-US" sz="4400" dirty="0"/>
+              <a:t>Custom Helpers Example Two</a:t>
+            </a:r>
+            <a:r>
+              <a:rPr lang="en-US" sz="8000" dirty="0"/>
+              <a:t/>
+            </a:r>
+            <a:br>
+              <a:rPr lang="en-US" sz="8000" dirty="0"/>
+            </a:br>
+            <a:r>
+              <a:rPr lang="en-US" sz="6600" dirty="0"/>
+              <a:t/>
+            </a:r>
+            <a:br>
+              <a:rPr lang="en-US" sz="6600" dirty="0"/>
+            </a:br>
+            <a:endParaRPr lang="en-US" dirty="0"/>
+          </a:p>
+        </p:txBody>
+      </p:sp>
+      <p:pic>
+        <p:nvPicPr>
+          <p:cNvPr id="4098" name="Picture 2"/>
+          <p:cNvPicPr>
+            <a:picLocks noGrp="1" noChangeAspect="1" noChangeArrowheads="1"/>
+          </p:cNvPicPr>
+          <p:nvPr>
+            <p:ph idx="1"/>
+          </p:nvPr>
+        </p:nvPicPr>
+        <p:blipFill>
+          <a:blip r:embed="rId2">
+            <a:extLst>
+              <a:ext uri="{28A0092B-C50C-407E-A947-70E740481C1C}">
+                <a14:useLocalDpi xmlns:a14="http://schemas.microsoft.com/office/drawing/2010/main" val="0"/>
+              </a:ext>
+            </a:extLst>
+          </a:blip>
+          <a:srcRect/>
+          <a:stretch>
+            <a:fillRect/>
+          </a:stretch>
+        </p:blipFill>
+        <p:spPr bwMode="auto">
+          <a:xfrm>
+            <a:off x="1752600" y="1905000"/>
+            <a:ext cx="5138057" cy="2133600"/>
+          </a:xfrm>
+          <a:prstGeom prst="rect">
+            <a:avLst/>
+          </a:prstGeom>
+          <a:noFill/>
+          <a:ln>
+            <a:noFill/>
+          </a:ln>
+          <a:extLst>
+            <a:ext uri="{909E8E84-426E-40DD-AFC4-6F175D3DCCD1}">
+              <a14:hiddenFill xmlns:a14="http://schemas.microsoft.com/office/drawing/2010/main">
+                <a:solidFill>
+                  <a:schemeClr val="accent1"/>
+                </a:solidFill>
+              </a14:hiddenFill>
+            </a:ext>
+            <a:ext uri="{91240B29-F687-4F45-9708-019B960494DF}">
+              <a14:hiddenLine xmlns:a14="http://schemas.microsoft.com/office/drawing/2010/main" w="9525">
+                <a:solidFill>
+                  <a:schemeClr val="tx1"/>
+                </a:solidFill>
+                <a:miter lim="800000"/>
+                <a:headEnd/>
+                <a:tailEnd/>
+              </a14:hiddenLine>
+            </a:ext>
+          </a:extLst>
+        </p:spPr>
+      </p:pic>
+    </p:spTree>
+    <p:extLst>
+      <p:ext uri="{BB962C8B-B14F-4D97-AF65-F5344CB8AC3E}">
+        <p14:creationId xmlns:p14="http://schemas.microsoft.com/office/powerpoint/2010/main" val="2130903783"/>
+      </p:ext>
+    </p:extLst>
+  </p:cSld>
+  <p:clrMapOvr>
+    <a:masterClrMapping/>
+  </p:clrMapOvr>
+</p:sld>
+</file>
+
+<file path=ppt/slides/slide11.xml><?xml version="1.0" encoding="utf-8"?>
+<p:sld xmlns:a="http://schemas.openxmlformats.org/drawingml/2006/main" xmlns:r="http://schemas.openxmlformats.org/officeDocument/2006/relationships" xmlns:p="http://schemas.openxmlformats.org/presentationml/2006/main">
+  <p:cSld>
+    <p:spTree>
+      <p:nvGrpSpPr>
+        <p:cNvPr id="1" name=""/>
+        <p:cNvGrpSpPr/>
+        <p:nvPr/>
+      </p:nvGrpSpPr>
+      <p:grpSpPr>
+        <a:xfrm>
+          <a:off x="0" y="0"/>
+          <a:ext cx="0" cy="0"/>
+          <a:chOff x="0" y="0"/>
+          <a:chExt cx="0" cy="0"/>
+        </a:xfrm>
+      </p:grpSpPr>
+      <p:sp>
+        <p:nvSpPr>
+          <p:cNvPr id="2" name="Title 1"/>
+          <p:cNvSpPr>
+            <a:spLocks noGrp="1"/>
+          </p:cNvSpPr>
+          <p:nvPr>
+            <p:ph type="title"/>
+          </p:nvPr>
+        </p:nvSpPr>
+        <p:spPr/>
+        <p:txBody>
+          <a:bodyPr>
+            <a:normAutofit/>
+          </a:bodyPr>
+          <a:lstStyle/>
+          <a:p>
+            <a:r>
+              <a:rPr lang="en-US" sz="4800" dirty="0"/>
+              <a:t>Partials</a:t>
+            </a:r>
+          </a:p>
+        </p:txBody>
+      </p:sp>
+      <p:sp>
+        <p:nvSpPr>
+          <p:cNvPr id="3" name="Content Placeholder 2"/>
+          <p:cNvSpPr>
+            <a:spLocks noGrp="1"/>
+          </p:cNvSpPr>
+          <p:nvPr>
+            <p:ph idx="1"/>
+          </p:nvPr>
+        </p:nvSpPr>
+        <p:spPr/>
+        <p:txBody>
+          <a:bodyPr/>
+          <a:lstStyle/>
+          <a:p>
+            <a:r>
+              <a:rPr lang="en-US" dirty="0"/>
+              <a:t>Partials come in handy when you have a chunk of a Handlebars.js template that you need to use in a few different </a:t>
+            </a:r>
+            <a:r>
+              <a:rPr lang="en-US" dirty="0" smtClean="0"/>
+              <a:t>contexts.</a:t>
+            </a:r>
+          </a:p>
+          <a:p>
+            <a:r>
+              <a:rPr lang="en-US" dirty="0" smtClean="0"/>
+              <a:t>The</a:t>
+            </a:r>
+            <a:r>
+              <a:rPr lang="en-US" dirty="0"/>
+              <a:t> </a:t>
+            </a:r>
+            <a:r>
+              <a:rPr lang="en-US" b="1" dirty="0" err="1"/>
+              <a:t>Handlebars.registerPartial</a:t>
+            </a:r>
+            <a:r>
+              <a:rPr lang="en-US" dirty="0"/>
+              <a:t> method registers a partial. </a:t>
+            </a:r>
+            <a:endParaRPr lang="en-US" dirty="0" smtClean="0"/>
+          </a:p>
+          <a:p>
+            <a:r>
+              <a:rPr lang="en-US" dirty="0" smtClean="0"/>
+              <a:t>It </a:t>
+            </a:r>
+            <a:r>
+              <a:rPr lang="en-US" dirty="0"/>
+              <a:t>takes the </a:t>
+            </a:r>
+            <a:r>
+              <a:rPr lang="en-US" i="1" dirty="0"/>
+              <a:t>name</a:t>
+            </a:r>
+            <a:r>
+              <a:rPr lang="en-US" dirty="0"/>
+              <a:t> of the partial as its first argument and either a </a:t>
+            </a:r>
+            <a:r>
+              <a:rPr lang="en-US" i="1" dirty="0"/>
+              <a:t>template source string</a:t>
+            </a:r>
+            <a:r>
+              <a:rPr lang="en-US" dirty="0"/>
+              <a:t> or a </a:t>
+            </a:r>
+            <a:r>
+              <a:rPr lang="en-US" i="1" dirty="0"/>
+              <a:t>compiled template</a:t>
+            </a:r>
+            <a:r>
+              <a:rPr lang="en-US" dirty="0"/>
+              <a:t> as its second argument.</a:t>
+            </a:r>
+          </a:p>
+          <a:p>
+            <a:r>
+              <a:rPr lang="en-US" dirty="0"/>
+              <a:t>To use a partial from a template, simply include </a:t>
+            </a:r>
+            <a:r>
+              <a:rPr lang="en-US" b="1" dirty="0"/>
+              <a:t>{{&gt; </a:t>
+            </a:r>
+            <a:r>
+              <a:rPr lang="en-US" b="1" dirty="0" err="1"/>
+              <a:t>partialName</a:t>
+            </a:r>
+            <a:r>
+              <a:rPr lang="en-US" b="1" dirty="0"/>
+              <a:t>}}</a:t>
+            </a:r>
+            <a:r>
+              <a:rPr lang="en-US" dirty="0"/>
+              <a:t>.</a:t>
+            </a:r>
+          </a:p>
+          <a:p>
+            <a:endParaRPr lang="en-US" dirty="0"/>
+          </a:p>
+        </p:txBody>
+      </p:sp>
+    </p:spTree>
+    <p:extLst>
+      <p:ext uri="{BB962C8B-B14F-4D97-AF65-F5344CB8AC3E}">
+        <p14:creationId xmlns:p14="http://schemas.microsoft.com/office/powerpoint/2010/main" val="3329268482"/>
+      </p:ext>
+    </p:extLst>
+  </p:cSld>
+  <p:clrMapOvr>
+    <a:masterClrMapping/>
+  </p:clrMapOvr>
+  <p:timing>
+    <p:tnLst>
+      <p:par>
+        <p:cTn id="1" dur="indefinite" restart="never" nodeType="tmRoot"/>
+      </p:par>
+    </p:tnLst>
+  </p:timing>
+</p:sld>
+</file>
+
+<file path=ppt/slides/slide12.xml><?xml version="1.0" encoding="utf-8"?>
 <p:sld xmlns:a="http://schemas.openxmlformats.org/drawingml/2006/main" xmlns:r="http://schemas.openxmlformats.org/officeDocument/2006/relationships" xmlns:p="http://schemas.openxmlformats.org/presentationml/2006/main">
   <p:cSld>
     <p:spTree>
@@ -8776,7 +9069,7 @@
 </p:sld>
 </file>
 
-<file path=ppt/slides/slide11.xml><?xml version="1.0" encoding="utf-8"?>
+<file path=ppt/slides/slide13.xml><?xml version="1.0" encoding="utf-8"?>
 <p:sld xmlns:a="http://schemas.openxmlformats.org/drawingml/2006/main" xmlns:r="http://schemas.openxmlformats.org/officeDocument/2006/relationships" xmlns:p="http://schemas.openxmlformats.org/presentationml/2006/main">
   <p:cSld>
     <p:spTree>
@@ -8992,7 +9285,6 @@
               <a:rPr lang="en-US" b="1" dirty="0"/>
               <a:t>the template</a:t>
             </a:r>
-            <a:endParaRPr lang="en-US" b="1" dirty="0"/>
           </a:p>
         </p:txBody>
       </p:sp>
@@ -9082,7 +9374,117 @@
 </p:sld>
 </file>
 
-<file path=ppt/slides/slide12.xml><?xml version="1.0" encoding="utf-8"?>
+<file path=ppt/slides/slide14.xml><?xml version="1.0" encoding="utf-8"?>
+<p:sld xmlns:a="http://schemas.openxmlformats.org/drawingml/2006/main" xmlns:r="http://schemas.openxmlformats.org/officeDocument/2006/relationships" xmlns:p="http://schemas.openxmlformats.org/presentationml/2006/main">
+  <p:cSld>
+    <p:spTree>
+      <p:nvGrpSpPr>
+        <p:cNvPr id="1" name=""/>
+        <p:cNvGrpSpPr/>
+        <p:nvPr/>
+      </p:nvGrpSpPr>
+      <p:grpSpPr>
+        <a:xfrm>
+          <a:off x="0" y="0"/>
+          <a:ext cx="0" cy="0"/>
+          <a:chOff x="0" y="0"/>
+          <a:chExt cx="0" cy="0"/>
+        </a:xfrm>
+      </p:grpSpPr>
+      <p:sp>
+        <p:nvSpPr>
+          <p:cNvPr id="2" name="Title 1"/>
+          <p:cNvSpPr>
+            <a:spLocks noGrp="1"/>
+          </p:cNvSpPr>
+          <p:nvPr>
+            <p:ph type="title"/>
+          </p:nvPr>
+        </p:nvSpPr>
+        <p:spPr/>
+        <p:txBody>
+          <a:bodyPr>
+            <a:normAutofit/>
+          </a:bodyPr>
+          <a:lstStyle/>
+          <a:p>
+            <a:r>
+              <a:rPr lang="en-US" sz="5400" dirty="0"/>
+              <a:t>Partials example</a:t>
+            </a:r>
+          </a:p>
+        </p:txBody>
+      </p:sp>
+      <p:pic>
+        <p:nvPicPr>
+          <p:cNvPr id="5122" name="Picture 2"/>
+          <p:cNvPicPr>
+            <a:picLocks noGrp="1" noChangeAspect="1" noChangeArrowheads="1"/>
+          </p:cNvPicPr>
+          <p:nvPr>
+            <p:ph idx="1"/>
+          </p:nvPr>
+        </p:nvPicPr>
+        <p:blipFill>
+          <a:blip r:embed="rId2">
+            <a:extLst>
+              <a:ext uri="{28A0092B-C50C-407E-A947-70E740481C1C}">
+                <a14:useLocalDpi xmlns:a14="http://schemas.microsoft.com/office/drawing/2010/main" val="0"/>
+              </a:ext>
+            </a:extLst>
+          </a:blip>
+          <a:srcRect/>
+          <a:stretch>
+            <a:fillRect/>
+          </a:stretch>
+        </p:blipFill>
+        <p:spPr bwMode="auto">
+          <a:xfrm>
+            <a:off x="2514600" y="2285999"/>
+            <a:ext cx="3768985" cy="4431965"/>
+          </a:xfrm>
+          <a:prstGeom prst="rect">
+            <a:avLst/>
+          </a:prstGeom>
+          <a:noFill/>
+          <a:ln>
+            <a:noFill/>
+          </a:ln>
+          <a:extLst>
+            <a:ext uri="{909E8E84-426E-40DD-AFC4-6F175D3DCCD1}">
+              <a14:hiddenFill xmlns:a14="http://schemas.microsoft.com/office/drawing/2010/main">
+                <a:solidFill>
+                  <a:schemeClr val="accent1"/>
+                </a:solidFill>
+              </a14:hiddenFill>
+            </a:ext>
+            <a:ext uri="{91240B29-F687-4F45-9708-019B960494DF}">
+              <a14:hiddenLine xmlns:a14="http://schemas.microsoft.com/office/drawing/2010/main" w="9525">
+                <a:solidFill>
+                  <a:schemeClr val="tx1"/>
+                </a:solidFill>
+                <a:miter lim="800000"/>
+                <a:headEnd/>
+                <a:tailEnd/>
+              </a14:hiddenLine>
+            </a:ext>
+          </a:extLst>
+        </p:spPr>
+      </p:pic>
+    </p:spTree>
+    <p:extLst>
+      <p:ext uri="{BB962C8B-B14F-4D97-AF65-F5344CB8AC3E}">
+        <p14:creationId xmlns:p14="http://schemas.microsoft.com/office/powerpoint/2010/main" val="2921276481"/>
+      </p:ext>
+    </p:extLst>
+  </p:cSld>
+  <p:clrMapOvr>
+    <a:masterClrMapping/>
+  </p:clrMapOvr>
+</p:sld>
+</file>
+
+<file path=ppt/slides/slide15.xml><?xml version="1.0" encoding="utf-8"?>
 <p:sld xmlns:a="http://schemas.openxmlformats.org/drawingml/2006/main" xmlns:r="http://schemas.openxmlformats.org/officeDocument/2006/relationships" xmlns:p="http://schemas.openxmlformats.org/presentationml/2006/main">
   <p:cSld>
     <p:spTree>
@@ -9196,7 +9598,7 @@
 </p:sld>
 </file>
 
-<file path=ppt/slides/slide13.xml><?xml version="1.0" encoding="utf-8"?>
+<file path=ppt/slides/slide16.xml><?xml version="1.0" encoding="utf-8"?>
 <p:sld xmlns:a="http://schemas.openxmlformats.org/drawingml/2006/main" xmlns:r="http://schemas.openxmlformats.org/officeDocument/2006/relationships" xmlns:p="http://schemas.openxmlformats.org/presentationml/2006/main">
   <p:cSld>
     <p:spTree>
@@ -9287,7 +9689,7 @@
 </p:sld>
 </file>
 
-<file path=ppt/slides/slide14.xml><?xml version="1.0" encoding="utf-8"?>
+<file path=ppt/slides/slide17.xml><?xml version="1.0" encoding="utf-8"?>
 <p:sld xmlns:a="http://schemas.openxmlformats.org/drawingml/2006/main" xmlns:r="http://schemas.openxmlformats.org/officeDocument/2006/relationships" xmlns:p="http://schemas.openxmlformats.org/presentationml/2006/main">
   <p:cSld>
     <p:spTree>
@@ -9421,7 +9823,7 @@
 </p:sld>
 </file>
 
-<file path=ppt/slides/slide15.xml><?xml version="1.0" encoding="utf-8"?>
+<file path=ppt/slides/slide18.xml><?xml version="1.0" encoding="utf-8"?>
 <p:sld xmlns:a="http://schemas.openxmlformats.org/drawingml/2006/main" xmlns:r="http://schemas.openxmlformats.org/officeDocument/2006/relationships" xmlns:p="http://schemas.openxmlformats.org/presentationml/2006/main">
   <p:cSld>
     <p:spTree>
@@ -9554,7 +9956,7 @@
 </p:sld>
 </file>
 
-<file path=ppt/slides/slide16.xml><?xml version="1.0" encoding="utf-8"?>
+<file path=ppt/slides/slide19.xml><?xml version="1.0" encoding="utf-8"?>
 <p:sld xmlns:a="http://schemas.openxmlformats.org/drawingml/2006/main" xmlns:r="http://schemas.openxmlformats.org/officeDocument/2006/relationships" xmlns:p="http://schemas.openxmlformats.org/presentationml/2006/main">
   <p:cSld>
     <p:spTree>
@@ -9688,7 +10090,106 @@
 </p:sld>
 </file>
 
-<file path=ppt/slides/slide17.xml><?xml version="1.0" encoding="utf-8"?>
+<file path=ppt/slides/slide2.xml><?xml version="1.0" encoding="utf-8"?>
+<p:sld xmlns:a="http://schemas.openxmlformats.org/drawingml/2006/main" xmlns:r="http://schemas.openxmlformats.org/officeDocument/2006/relationships" xmlns:p="http://schemas.openxmlformats.org/presentationml/2006/main">
+  <p:cSld>
+    <p:spTree>
+      <p:nvGrpSpPr>
+        <p:cNvPr id="1" name=""/>
+        <p:cNvGrpSpPr/>
+        <p:nvPr/>
+      </p:nvGrpSpPr>
+      <p:grpSpPr>
+        <a:xfrm>
+          <a:off x="0" y="0"/>
+          <a:ext cx="0" cy="0"/>
+          <a:chOff x="0" y="0"/>
+          <a:chExt cx="0" cy="0"/>
+        </a:xfrm>
+      </p:grpSpPr>
+      <p:sp>
+        <p:nvSpPr>
+          <p:cNvPr id="2" name="Title 1"/>
+          <p:cNvSpPr>
+            <a:spLocks noGrp="1"/>
+          </p:cNvSpPr>
+          <p:nvPr>
+            <p:ph type="title"/>
+          </p:nvPr>
+        </p:nvSpPr>
+        <p:spPr/>
+        <p:txBody>
+          <a:bodyPr>
+            <a:normAutofit/>
+          </a:bodyPr>
+          <a:lstStyle/>
+          <a:p>
+            <a:r>
+              <a:rPr lang="en-US" altLang="en-US" sz="4800" b="1" dirty="0"/>
+              <a:t>Handlebars 2</a:t>
+            </a:r>
+            <a:endParaRPr lang="en-US" sz="4800" dirty="0"/>
+          </a:p>
+        </p:txBody>
+      </p:sp>
+      <p:sp>
+        <p:nvSpPr>
+          <p:cNvPr id="3" name="Content Placeholder 2"/>
+          <p:cNvSpPr>
+            <a:spLocks noGrp="1"/>
+          </p:cNvSpPr>
+          <p:nvPr>
+            <p:ph idx="1"/>
+          </p:nvPr>
+        </p:nvSpPr>
+        <p:spPr/>
+        <p:txBody>
+          <a:bodyPr>
+            <a:normAutofit/>
+          </a:bodyPr>
+          <a:lstStyle/>
+          <a:p>
+            <a:r>
+              <a:rPr lang="en-US" sz="2400" dirty="0" smtClean="0"/>
+              <a:t>Custom Helpers</a:t>
+            </a:r>
+          </a:p>
+          <a:p>
+            <a:r>
+              <a:rPr lang="en-US" sz="2400" dirty="0" smtClean="0"/>
+              <a:t>Partials</a:t>
+            </a:r>
+          </a:p>
+          <a:p>
+            <a:r>
+              <a:rPr lang="en-US" sz="2400" dirty="0" smtClean="0"/>
+              <a:t>Adding New Data</a:t>
+            </a:r>
+            <a:endParaRPr lang="en-US" sz="2400" dirty="0"/>
+          </a:p>
+        </p:txBody>
+      </p:sp>
+    </p:spTree>
+    <p:extLst>
+      <p:ext uri="{BB962C8B-B14F-4D97-AF65-F5344CB8AC3E}">
+        <p14:creationId xmlns:p14="http://schemas.microsoft.com/office/powerpoint/2010/main" val="4237438819"/>
+      </p:ext>
+    </p:extLst>
+  </p:cSld>
+  <p:clrMapOvr>
+    <a:masterClrMapping/>
+  </p:clrMapOvr>
+  <p:timing>
+    <p:tnLst>
+      <p:par>
+        <p:cTn id="1" dur="indefinite" restart="never" nodeType="tmRoot"/>
+      </p:par>
+    </p:tnLst>
+  </p:timing>
+</p:sld>
+</file>
+
+<file path=ppt/slides/slide20.xml><?xml version="1.0" encoding="utf-8"?>
 <p:sld xmlns:a="http://schemas.openxmlformats.org/drawingml/2006/main" xmlns:r="http://schemas.openxmlformats.org/officeDocument/2006/relationships" xmlns:p="http://schemas.openxmlformats.org/presentationml/2006/main">
   <p:cSld>
     <p:spTree>
@@ -9806,105 +10307,6 @@
     <p:extLst>
       <p:ext uri="{BB962C8B-B14F-4D97-AF65-F5344CB8AC3E}">
         <p14:creationId xmlns:p14="http://schemas.microsoft.com/office/powerpoint/2010/main" val="118996590"/>
-      </p:ext>
-    </p:extLst>
-  </p:cSld>
-  <p:clrMapOvr>
-    <a:masterClrMapping/>
-  </p:clrMapOvr>
-  <p:timing>
-    <p:tnLst>
-      <p:par>
-        <p:cTn id="1" dur="indefinite" restart="never" nodeType="tmRoot"/>
-      </p:par>
-    </p:tnLst>
-  </p:timing>
-</p:sld>
-</file>
-
-<file path=ppt/slides/slide2.xml><?xml version="1.0" encoding="utf-8"?>
-<p:sld xmlns:a="http://schemas.openxmlformats.org/drawingml/2006/main" xmlns:r="http://schemas.openxmlformats.org/officeDocument/2006/relationships" xmlns:p="http://schemas.openxmlformats.org/presentationml/2006/main">
-  <p:cSld>
-    <p:spTree>
-      <p:nvGrpSpPr>
-        <p:cNvPr id="1" name=""/>
-        <p:cNvGrpSpPr/>
-        <p:nvPr/>
-      </p:nvGrpSpPr>
-      <p:grpSpPr>
-        <a:xfrm>
-          <a:off x="0" y="0"/>
-          <a:ext cx="0" cy="0"/>
-          <a:chOff x="0" y="0"/>
-          <a:chExt cx="0" cy="0"/>
-        </a:xfrm>
-      </p:grpSpPr>
-      <p:sp>
-        <p:nvSpPr>
-          <p:cNvPr id="2" name="Title 1"/>
-          <p:cNvSpPr>
-            <a:spLocks noGrp="1"/>
-          </p:cNvSpPr>
-          <p:nvPr>
-            <p:ph type="title"/>
-          </p:nvPr>
-        </p:nvSpPr>
-        <p:spPr/>
-        <p:txBody>
-          <a:bodyPr>
-            <a:normAutofit/>
-          </a:bodyPr>
-          <a:lstStyle/>
-          <a:p>
-            <a:r>
-              <a:rPr lang="en-US" altLang="en-US" sz="4800" b="1" dirty="0"/>
-              <a:t>Handlebars 2</a:t>
-            </a:r>
-            <a:endParaRPr lang="en-US" sz="4800" dirty="0"/>
-          </a:p>
-        </p:txBody>
-      </p:sp>
-      <p:sp>
-        <p:nvSpPr>
-          <p:cNvPr id="3" name="Content Placeholder 2"/>
-          <p:cNvSpPr>
-            <a:spLocks noGrp="1"/>
-          </p:cNvSpPr>
-          <p:nvPr>
-            <p:ph idx="1"/>
-          </p:nvPr>
-        </p:nvSpPr>
-        <p:spPr/>
-        <p:txBody>
-          <a:bodyPr>
-            <a:normAutofit/>
-          </a:bodyPr>
-          <a:lstStyle/>
-          <a:p>
-            <a:r>
-              <a:rPr lang="en-US" sz="2400" dirty="0" smtClean="0"/>
-              <a:t>Custom Helpers</a:t>
-            </a:r>
-          </a:p>
-          <a:p>
-            <a:r>
-              <a:rPr lang="en-US" sz="2400" dirty="0" smtClean="0"/>
-              <a:t>Partials</a:t>
-            </a:r>
-          </a:p>
-          <a:p>
-            <a:r>
-              <a:rPr lang="en-US" sz="2400" dirty="0" smtClean="0"/>
-              <a:t>Adding New Data</a:t>
-            </a:r>
-            <a:endParaRPr lang="en-US" sz="2400" dirty="0"/>
-          </a:p>
-        </p:txBody>
-      </p:sp>
-    </p:spTree>
-    <p:extLst>
-      <p:ext uri="{BB962C8B-B14F-4D97-AF65-F5344CB8AC3E}">
-        <p14:creationId xmlns:p14="http://schemas.microsoft.com/office/powerpoint/2010/main" val="4237438819"/>
       </p:ext>
     </p:extLst>
   </p:cSld>
@@ -10611,40 +11013,24 @@
         <p:spPr/>
         <p:txBody>
           <a:bodyPr>
-            <a:normAutofit fontScale="90000"/>
+            <a:noAutofit/>
           </a:bodyPr>
           <a:lstStyle/>
           <a:p>
             <a:r>
               <a:rPr lang="en-US" sz="4400" dirty="0"/>
-              <a:t>Custom </a:t>
-            </a:r>
-            <a:r>
-              <a:rPr lang="en-US" sz="4400" dirty="0" smtClean="0"/>
-              <a:t>Helpers </a:t>
-            </a:r>
-            <a:r>
+              <a:t>Custom Helpers Example One</a:t>
+            </a:r>
+            <a:br>
               <a:rPr lang="en-US" sz="4400" dirty="0"/>
-              <a:t>Example </a:t>
-            </a:r>
-            <a:r>
-              <a:rPr lang="en-US" sz="4400" dirty="0" smtClean="0"/>
-              <a:t>Two</a:t>
-            </a:r>
-            <a:r>
-              <a:rPr lang="en-US" sz="5400" dirty="0"/>
-              <a:t/>
-            </a:r>
-            <a:br>
-              <a:rPr lang="en-US" sz="5400" dirty="0"/>
             </a:br>
-            <a:endParaRPr lang="en-US" dirty="0"/>
+            <a:endParaRPr lang="en-US" sz="4000" dirty="0"/>
           </a:p>
         </p:txBody>
       </p:sp>
       <p:pic>
         <p:nvPicPr>
-          <p:cNvPr id="2050" name="Picture 2"/>
+          <p:cNvPr id="3074" name="Picture 2"/>
           <p:cNvPicPr>
             <a:picLocks noGrp="1" noChangeAspect="1" noChangeArrowheads="1"/>
           </p:cNvPicPr>
@@ -10667,8 +11053,155 @@
         </p:blipFill>
         <p:spPr bwMode="auto">
           <a:xfrm>
-            <a:off x="990600" y="2133600"/>
-            <a:ext cx="6019800" cy="2190373"/>
+            <a:off x="2286000" y="2362200"/>
+            <a:ext cx="4661653" cy="1617663"/>
+          </a:xfrm>
+          <a:prstGeom prst="rect">
+            <a:avLst/>
+          </a:prstGeom>
+          <a:noFill/>
+          <a:ln>
+            <a:noFill/>
+          </a:ln>
+          <a:extLst>
+            <a:ext uri="{909E8E84-426E-40DD-AFC4-6F175D3DCCD1}">
+              <a14:hiddenFill xmlns:a14="http://schemas.microsoft.com/office/drawing/2010/main">
+                <a:solidFill>
+                  <a:schemeClr val="accent1"/>
+                </a:solidFill>
+              </a14:hiddenFill>
+            </a:ext>
+            <a:ext uri="{91240B29-F687-4F45-9708-019B960494DF}">
+              <a14:hiddenLine xmlns:a14="http://schemas.microsoft.com/office/drawing/2010/main" w="9525">
+                <a:solidFill>
+                  <a:schemeClr val="tx1"/>
+                </a:solidFill>
+                <a:miter lim="800000"/>
+                <a:headEnd/>
+                <a:tailEnd/>
+              </a14:hiddenLine>
+            </a:ext>
+          </a:extLst>
+        </p:spPr>
+      </p:pic>
+    </p:spTree>
+    <p:extLst>
+      <p:ext uri="{BB962C8B-B14F-4D97-AF65-F5344CB8AC3E}">
+        <p14:creationId xmlns:p14="http://schemas.microsoft.com/office/powerpoint/2010/main" val="3269669025"/>
+      </p:ext>
+    </p:extLst>
+  </p:cSld>
+  <p:clrMapOvr>
+    <a:masterClrMapping/>
+  </p:clrMapOvr>
+</p:sld>
+</file>
+
+<file path=ppt/slides/slide7.xml><?xml version="1.0" encoding="utf-8"?>
+<p:sld xmlns:a="http://schemas.openxmlformats.org/drawingml/2006/main" xmlns:r="http://schemas.openxmlformats.org/officeDocument/2006/relationships" xmlns:p="http://schemas.openxmlformats.org/presentationml/2006/main">
+  <p:cSld>
+    <p:spTree>
+      <p:nvGrpSpPr>
+        <p:cNvPr id="1" name=""/>
+        <p:cNvGrpSpPr/>
+        <p:nvPr/>
+      </p:nvGrpSpPr>
+      <p:grpSpPr>
+        <a:xfrm>
+          <a:off x="0" y="0"/>
+          <a:ext cx="0" cy="0"/>
+          <a:chOff x="0" y="0"/>
+          <a:chExt cx="0" cy="0"/>
+        </a:xfrm>
+      </p:grpSpPr>
+      <p:sp>
+        <p:nvSpPr>
+          <p:cNvPr id="2" name="Title 1"/>
+          <p:cNvSpPr>
+            <a:spLocks noGrp="1"/>
+          </p:cNvSpPr>
+          <p:nvPr>
+            <p:ph type="title"/>
+          </p:nvPr>
+        </p:nvSpPr>
+        <p:spPr/>
+        <p:txBody>
+          <a:bodyPr>
+            <a:normAutofit fontScale="90000"/>
+          </a:bodyPr>
+          <a:lstStyle/>
+          <a:p>
+            <a:r>
+              <a:rPr lang="en-US" sz="4400" dirty="0"/>
+              <a:t>Custom </a:t>
+            </a:r>
+            <a:r>
+              <a:rPr lang="en-US" sz="4400" dirty="0" smtClean="0"/>
+              <a:t>Helpers </a:t>
+            </a:r>
+            <a:r>
+              <a:rPr lang="en-US" sz="4400" dirty="0"/>
+              <a:t>Example </a:t>
+            </a:r>
+            <a:r>
+              <a:rPr lang="en-US" sz="4400" dirty="0" smtClean="0"/>
+              <a:t>Two</a:t>
+            </a:r>
+            <a:r>
+              <a:rPr lang="en-US" sz="5400" dirty="0"/>
+              <a:t/>
+            </a:r>
+            <a:br>
+              <a:rPr lang="en-US" sz="5400" dirty="0"/>
+            </a:br>
+            <a:endParaRPr lang="en-US" dirty="0"/>
+          </a:p>
+        </p:txBody>
+      </p:sp>
+      <p:sp>
+        <p:nvSpPr>
+          <p:cNvPr id="3" name="Content Placeholder 2"/>
+          <p:cNvSpPr>
+            <a:spLocks noGrp="1"/>
+          </p:cNvSpPr>
+          <p:nvPr>
+            <p:ph idx="1"/>
+          </p:nvPr>
+        </p:nvSpPr>
+        <p:spPr/>
+        <p:txBody>
+          <a:bodyPr/>
+          <a:lstStyle/>
+          <a:p>
+            <a:endParaRPr lang="en-US"/>
+          </a:p>
+        </p:txBody>
+      </p:sp>
+      <p:pic>
+        <p:nvPicPr>
+          <p:cNvPr id="1026" name="Picture 2"/>
+          <p:cNvPicPr>
+            <a:picLocks noChangeAspect="1" noChangeArrowheads="1"/>
+          </p:cNvPicPr>
+          <p:nvPr/>
+        </p:nvPicPr>
+        <p:blipFill>
+          <a:blip r:embed="rId2">
+            <a:extLst>
+              <a:ext uri="{28A0092B-C50C-407E-A947-70E740481C1C}">
+                <a14:useLocalDpi xmlns:a14="http://schemas.microsoft.com/office/drawing/2010/main" val="0"/>
+              </a:ext>
+            </a:extLst>
+          </a:blip>
+          <a:srcRect/>
+          <a:stretch>
+            <a:fillRect/>
+          </a:stretch>
+        </p:blipFill>
+        <p:spPr bwMode="auto">
+          <a:xfrm>
+            <a:off x="1371600" y="2195052"/>
+            <a:ext cx="6918960" cy="2590800"/>
           </a:xfrm>
           <a:prstGeom prst="rect">
             <a:avLst/>
@@ -10718,7 +11251,7 @@
 </p:sld>
 </file>
 
-<file path=ppt/slides/slide7.xml><?xml version="1.0" encoding="utf-8"?>
+<file path=ppt/slides/slide8.xml><?xml version="1.0" encoding="utf-8"?>
 <p:sld xmlns:a="http://schemas.openxmlformats.org/drawingml/2006/main" xmlns:r="http://schemas.openxmlformats.org/officeDocument/2006/relationships" xmlns:p="http://schemas.openxmlformats.org/presentationml/2006/main">
   <p:cSld>
     <p:spTree>
@@ -10767,15 +11300,32 @@
           </a:p>
         </p:txBody>
       </p:sp>
-      <p:pic>
-        <p:nvPicPr>
-          <p:cNvPr id="4099" name="Picture 3"/>
-          <p:cNvPicPr>
-            <a:picLocks noGrp="1" noChangeAspect="1" noChangeArrowheads="1"/>
-          </p:cNvPicPr>
+      <p:sp>
+        <p:nvSpPr>
+          <p:cNvPr id="3" name="Content Placeholder 2"/>
+          <p:cNvSpPr>
+            <a:spLocks noGrp="1"/>
+          </p:cNvSpPr>
           <p:nvPr>
             <p:ph idx="1"/>
           </p:nvPr>
+        </p:nvSpPr>
+        <p:spPr/>
+        <p:txBody>
+          <a:bodyPr/>
+          <a:lstStyle/>
+          <a:p>
+            <a:endParaRPr lang="en-US"/>
+          </a:p>
+        </p:txBody>
+      </p:sp>
+      <p:pic>
+        <p:nvPicPr>
+          <p:cNvPr id="2050" name="Picture 2"/>
+          <p:cNvPicPr>
+            <a:picLocks noChangeAspect="1" noChangeArrowheads="1"/>
+          </p:cNvPicPr>
+          <p:nvPr/>
         </p:nvPicPr>
         <p:blipFill>
           <a:blip r:embed="rId2">
@@ -10792,8 +11342,8 @@
         </p:blipFill>
         <p:spPr bwMode="auto">
           <a:xfrm>
-            <a:off x="1524000" y="2057400"/>
-            <a:ext cx="4836319" cy="3975253"/>
+            <a:off x="1828800" y="2071532"/>
+            <a:ext cx="5638800" cy="4170363"/>
           </a:xfrm>
           <a:prstGeom prst="rect">
             <a:avLst/>
@@ -10843,7 +11393,7 @@
 </p:sld>
 </file>
 
-<file path=ppt/slides/slide8.xml><?xml version="1.0" encoding="utf-8"?>
+<file path=ppt/slides/slide9.xml><?xml version="1.0" encoding="utf-8"?>
 <p:sld xmlns:a="http://schemas.openxmlformats.org/drawingml/2006/main" xmlns:r="http://schemas.openxmlformats.org/officeDocument/2006/relationships" xmlns:p="http://schemas.openxmlformats.org/presentationml/2006/main">
   <p:cSld>
     <p:spTree>
@@ -10959,171 +11509,6 @@
     <p:extLst>
       <p:ext uri="{BB962C8B-B14F-4D97-AF65-F5344CB8AC3E}">
         <p14:creationId xmlns:p14="http://schemas.microsoft.com/office/powerpoint/2010/main" val="1757824833"/>
-      </p:ext>
-    </p:extLst>
-  </p:cSld>
-  <p:clrMapOvr>
-    <a:masterClrMapping/>
-  </p:clrMapOvr>
-  <p:timing>
-    <p:tnLst>
-      <p:par>
-        <p:cTn id="1" dur="indefinite" restart="never" nodeType="tmRoot"/>
-      </p:par>
-    </p:tnLst>
-  </p:timing>
-</p:sld>
-</file>
-
-<file path=ppt/slides/slide9.xml><?xml version="1.0" encoding="utf-8"?>
-<p:sld xmlns:a="http://schemas.openxmlformats.org/drawingml/2006/main" xmlns:r="http://schemas.openxmlformats.org/officeDocument/2006/relationships" xmlns:p="http://schemas.openxmlformats.org/presentationml/2006/main">
-  <p:cSld>
-    <p:spTree>
-      <p:nvGrpSpPr>
-        <p:cNvPr id="1" name=""/>
-        <p:cNvGrpSpPr/>
-        <p:nvPr/>
-      </p:nvGrpSpPr>
-      <p:grpSpPr>
-        <a:xfrm>
-          <a:off x="0" y="0"/>
-          <a:ext cx="0" cy="0"/>
-          <a:chOff x="0" y="0"/>
-          <a:chExt cx="0" cy="0"/>
-        </a:xfrm>
-      </p:grpSpPr>
-      <p:sp>
-        <p:nvSpPr>
-          <p:cNvPr id="2" name="Title 1"/>
-          <p:cNvSpPr>
-            <a:spLocks noGrp="1"/>
-          </p:cNvSpPr>
-          <p:nvPr>
-            <p:ph type="title"/>
-          </p:nvPr>
-        </p:nvSpPr>
-        <p:spPr/>
-        <p:txBody>
-          <a:bodyPr>
-            <a:normAutofit/>
-          </a:bodyPr>
-          <a:lstStyle/>
-          <a:p>
-            <a:r>
-              <a:rPr lang="en-US" sz="4800" dirty="0"/>
-              <a:t>Partials</a:t>
-            </a:r>
-          </a:p>
-        </p:txBody>
-      </p:sp>
-      <p:sp>
-        <p:nvSpPr>
-          <p:cNvPr id="3" name="Content Placeholder 2"/>
-          <p:cNvSpPr>
-            <a:spLocks noGrp="1"/>
-          </p:cNvSpPr>
-          <p:nvPr>
-            <p:ph idx="1"/>
-          </p:nvPr>
-        </p:nvSpPr>
-        <p:spPr/>
-        <p:txBody>
-          <a:bodyPr/>
-          <a:lstStyle/>
-          <a:p>
-            <a:r>
-              <a:rPr lang="en-US" dirty="0"/>
-              <a:t>Partials come in handy when you have a chunk of a Handlebars.js template that you need to use in a few different </a:t>
-            </a:r>
-            <a:r>
-              <a:rPr lang="en-US" dirty="0" smtClean="0"/>
-              <a:t>contexts.</a:t>
-            </a:r>
-          </a:p>
-          <a:p>
-            <a:r>
-              <a:rPr lang="en-US" dirty="0" smtClean="0"/>
-              <a:t>The</a:t>
-            </a:r>
-            <a:r>
-              <a:rPr lang="en-US" dirty="0"/>
-              <a:t> </a:t>
-            </a:r>
-            <a:r>
-              <a:rPr lang="en-US" b="1" dirty="0" err="1"/>
-              <a:t>Handlebars.registerPartial</a:t>
-            </a:r>
-            <a:r>
-              <a:rPr lang="en-US" dirty="0"/>
-              <a:t> method registers a partial. </a:t>
-            </a:r>
-            <a:endParaRPr lang="en-US" dirty="0" smtClean="0"/>
-          </a:p>
-          <a:p>
-            <a:r>
-              <a:rPr lang="en-US" dirty="0" smtClean="0"/>
-              <a:t>It </a:t>
-            </a:r>
-            <a:r>
-              <a:rPr lang="en-US" dirty="0"/>
-              <a:t>takes the </a:t>
-            </a:r>
-            <a:r>
-              <a:rPr lang="en-US" i="1" dirty="0"/>
-              <a:t>name</a:t>
-            </a:r>
-            <a:r>
-              <a:rPr lang="en-US" dirty="0"/>
-              <a:t> of the partial as its first argument and either a </a:t>
-            </a:r>
-            <a:r>
-              <a:rPr lang="en-US" i="1" dirty="0"/>
-              <a:t>template source string</a:t>
-            </a:r>
-            <a:r>
-              <a:rPr lang="en-US" dirty="0"/>
-              <a:t> or a </a:t>
-            </a:r>
-            <a:r>
-              <a:rPr lang="en-US" i="1" dirty="0"/>
-              <a:t>compiled template</a:t>
-            </a:r>
-            <a:r>
-              <a:rPr lang="en-US" dirty="0"/>
-              <a:t> as its second argument.</a:t>
-            </a:r>
-          </a:p>
-          <a:p>
-            <a:r>
-              <a:rPr lang="en-US" dirty="0"/>
-              <a:t>To use a partial from a template, simply include </a:t>
-            </a:r>
-            <a:r>
-              <a:rPr lang="en-US" b="1" dirty="0"/>
-              <a:t>{{&gt; </a:t>
-            </a:r>
-            <a:r>
-              <a:rPr lang="en-US" b="1" dirty="0" err="1"/>
-              <a:t>partialName</a:t>
-            </a:r>
-            <a:r>
-              <a:rPr lang="en-US" b="1" dirty="0"/>
-              <a:t>}}</a:t>
-            </a:r>
-            <a:r>
-              <a:rPr lang="en-US" dirty="0"/>
-              <a:t>.</a:t>
-            </a:r>
-          </a:p>
-          <a:p>
-            <a:endParaRPr lang="en-US" dirty="0"/>
-          </a:p>
-        </p:txBody>
-      </p:sp>
-    </p:spTree>
-    <p:extLst>
-      <p:ext uri="{BB962C8B-B14F-4D97-AF65-F5344CB8AC3E}">
-        <p14:creationId xmlns:p14="http://schemas.microsoft.com/office/powerpoint/2010/main" val="3329268482"/>
       </p:ext>
     </p:extLst>
   </p:cSld>
@@ -11394,7 +11779,7 @@
   <a:extraClrSchemeLst/>
   <a:extLst>
     <a:ext uri="{05A4C25C-085E-4340-85A3-A5531E510DB2}">
-      <thm15:themeFamily xmlns="" xmlns:thm15="http://schemas.microsoft.com/office/thememl/2012/main" name="Badge" id="{71A07785-5930-41D4-9A83-E23602B48E98}" vid="{771EA782-DFA6-45B1-AEA3-661F1715B310}"/>
+      <thm15:themeFamily xmlns:thm15="http://schemas.microsoft.com/office/thememl/2012/main" xmlns="" name="Badge" id="{71A07785-5930-41D4-9A83-E23602B48E98}" vid="{771EA782-DFA6-45B1-AEA3-661F1715B310}"/>
     </a:ext>
   </a:extLst>
 </a:theme>

</xml_diff>